<commit_message>
Sub 4 yt link added, updated
</commit_message>
<xml_diff>
--- a/Submission5/Slide.pptx
+++ b/Submission5/Slide.pptx
@@ -6974,7 +6974,7 @@
             <a:tbl>
               <a:tblPr>
                 <a:noFill/>
-                <a:tableStyleId>{E18930EF-A56B-4C91-BD09-CDEDFE04D810}</a:tableStyleId>
+                <a:tableStyleId>{A1BCF6AE-FFE1-4261-A86A-6CA09D8AF017}</a:tableStyleId>
               </a:tblPr>
               <a:tblGrid>
                 <a:gridCol w="1722950"/>
@@ -8234,7 +8234,7 @@
                 <a:cs typeface="Roboto Slab"/>
                 <a:sym typeface="Roboto Slab"/>
               </a:rPr>
-              <a:t>one we were looking for we combined it with Grad-CAM to see if there were any improvement.</a:t>
+              <a:t>one we combined it with Grad-CAM to see if there were any improvement.</a:t>
             </a:r>
             <a:r>
               <a:rPr lang="en" sz="1500">
@@ -8353,7 +8353,7 @@
             </a:pPr>
             <a:r>
               <a:rPr lang="en" sz="1100"/>
-              <a:t>MobileNet had the best accuracy out of all the </a:t>
+              <a:t>MobileNet had the best accuracy out of all the Models. </a:t>
             </a:r>
             <a:endParaRPr sz="1100"/>
           </a:p>
@@ -8369,11 +8369,11 @@
             </a:pPr>
             <a:r>
               <a:rPr lang="en" sz="1100"/>
-              <a:t>Models. Now, </a:t>
+              <a:t>Now, </a:t>
             </a:r>
             <a:r>
               <a:rPr lang="en" sz="1100"/>
-              <a:t>MobileNet with or Without </a:t>
+              <a:t>MobileNet with or Without Grad-CAM had same accuracy. </a:t>
             </a:r>
             <a:endParaRPr sz="1100"/>
           </a:p>
@@ -8389,7 +8389,7 @@
             </a:pPr>
             <a:r>
               <a:rPr lang="en" sz="1100"/>
-              <a:t>Grad-CAM had same accuracy. That is because</a:t>
+              <a:t>That is because Grad-CAM does not actually help in training the model </a:t>
             </a:r>
             <a:endParaRPr sz="1100"/>
           </a:p>
@@ -8399,45 +8399,13 @@
                 <a:spcPts val="1200"/>
               </a:spcBef>
               <a:spcAft>
-                <a:spcPts val="0"/>
+                <a:spcPts val="1200"/>
               </a:spcAft>
               <a:buNone/>
             </a:pPr>
             <a:r>
               <a:rPr lang="en" sz="1100"/>
-              <a:t> Grad-CAM does not actually help in training the</a:t>
-            </a:r>
-            <a:endParaRPr sz="1100"/>
-          </a:p>
-          <a:p>
-            <a:pPr indent="0" lvl="0" marL="0" rtl="0" algn="l">
-              <a:spcBef>
-                <a:spcPts val="1200"/>
-              </a:spcBef>
-              <a:spcAft>
-                <a:spcPts val="0"/>
-              </a:spcAft>
-              <a:buNone/>
-            </a:pPr>
-            <a:r>
-              <a:rPr lang="en" sz="1100"/>
-              <a:t> Model but helps the model more in decision </a:t>
-            </a:r>
-            <a:endParaRPr sz="1100"/>
-          </a:p>
-          <a:p>
-            <a:pPr indent="0" lvl="0" marL="0" rtl="0" algn="l">
-              <a:spcBef>
-                <a:spcPts val="1200"/>
-              </a:spcBef>
-              <a:spcAft>
-                <a:spcPts val="1200"/>
-              </a:spcAft>
-              <a:buNone/>
-            </a:pPr>
-            <a:r>
-              <a:rPr lang="en" sz="1100"/>
-              <a:t>making. </a:t>
+              <a:t>but helps the model more in decision making. </a:t>
             </a:r>
             <a:endParaRPr sz="1100"/>
           </a:p>
@@ -8459,8 +8427,8 @@
         </p:blipFill>
         <p:spPr>
           <a:xfrm>
-            <a:off x="3500300" y="1207825"/>
-            <a:ext cx="5255800" cy="2819400"/>
+            <a:off x="5431863" y="1144113"/>
+            <a:ext cx="3324225" cy="1247775"/>
           </a:xfrm>
           <a:prstGeom prst="rect">
             <a:avLst/>

</xml_diff>